<commit_message>
Made ppt comments more concise
</commit_message>
<xml_diff>
--- a/Top Chemistry-Related Youtube Channels.pptx
+++ b/Top Chemistry-Related Youtube Channels.pptx
@@ -119,6 +119,11 @@
       </a:defRPr>
     </a:lvl9pPr>
   </p:defaultTextStyle>
+  <p:extLst>
+    <p:ext uri="{EFAFB233-063F-42B5-8137-9DF3F51BA10A}">
+      <p15:sldGuideLst xmlns:p15="http://schemas.microsoft.com/office/powerpoint/2012/main"/>
+    </p:ext>
+  </p:extLst>
 </p:presentation>
 </file>
 
@@ -204,7 +209,7 @@
           <a:p>
             <a:fld id="{BDC5E83D-D379-A340-B7FA-EF82F413A74A}" type="datetimeFigureOut">
               <a:rPr lang="en-US" smtClean="0"/>
-              <a:t>1/18/24</a:t>
+              <a:t>1/22/24</a:t>
             </a:fld>
             <a:endParaRPr lang="en-US"/>
           </a:p>
@@ -618,7 +623,7 @@
           <a:p>
             <a:fld id="{809BC358-6535-5449-A00E-96BE31C02186}" type="datetime1">
               <a:rPr lang="en-CA" smtClean="0"/>
-              <a:t>2024-01-18</a:t>
+              <a:t>2024-01-22</a:t>
             </a:fld>
             <a:endParaRPr lang="en-US"/>
           </a:p>
@@ -816,7 +821,7 @@
           <a:p>
             <a:fld id="{A21B44AE-75BF-0B43-863B-31F16CCD3504}" type="datetime1">
               <a:rPr lang="en-CA" smtClean="0"/>
-              <a:t>2024-01-18</a:t>
+              <a:t>2024-01-22</a:t>
             </a:fld>
             <a:endParaRPr lang="en-US"/>
           </a:p>
@@ -1024,7 +1029,7 @@
           <a:p>
             <a:fld id="{9A7A8518-D4AD-EA43-82F1-476476C0C568}" type="datetime1">
               <a:rPr lang="en-CA" smtClean="0"/>
-              <a:t>2024-01-18</a:t>
+              <a:t>2024-01-22</a:t>
             </a:fld>
             <a:endParaRPr lang="en-US"/>
           </a:p>
@@ -1222,7 +1227,7 @@
           <a:p>
             <a:fld id="{4A835C6E-D71F-D044-A3B5-586761BF2625}" type="datetime1">
               <a:rPr lang="en-CA" smtClean="0"/>
-              <a:t>2024-01-18</a:t>
+              <a:t>2024-01-22</a:t>
             </a:fld>
             <a:endParaRPr lang="en-US"/>
           </a:p>
@@ -1497,7 +1502,7 @@
           <a:p>
             <a:fld id="{65BBEEB9-5A69-0D41-9E65-AE310EBD0383}" type="datetime1">
               <a:rPr lang="en-CA" smtClean="0"/>
-              <a:t>2024-01-18</a:t>
+              <a:t>2024-01-22</a:t>
             </a:fld>
             <a:endParaRPr lang="en-US"/>
           </a:p>
@@ -1762,7 +1767,7 @@
           <a:p>
             <a:fld id="{0F070277-8B50-ED47-8B3E-80604199ADC5}" type="datetime1">
               <a:rPr lang="en-CA" smtClean="0"/>
-              <a:t>2024-01-18</a:t>
+              <a:t>2024-01-22</a:t>
             </a:fld>
             <a:endParaRPr lang="en-US"/>
           </a:p>
@@ -2174,7 +2179,7 @@
           <a:p>
             <a:fld id="{6E11AC7C-8AB1-B847-B67C-9B12E0972C5F}" type="datetime1">
               <a:rPr lang="en-CA" smtClean="0"/>
-              <a:t>2024-01-18</a:t>
+              <a:t>2024-01-22</a:t>
             </a:fld>
             <a:endParaRPr lang="en-US"/>
           </a:p>
@@ -2315,7 +2320,7 @@
           <a:p>
             <a:fld id="{8964F246-A3E9-BF47-8206-1CBA14A1BC39}" type="datetime1">
               <a:rPr lang="en-CA" smtClean="0"/>
-              <a:t>2024-01-18</a:t>
+              <a:t>2024-01-22</a:t>
             </a:fld>
             <a:endParaRPr lang="en-US"/>
           </a:p>
@@ -2428,7 +2433,7 @@
           <a:p>
             <a:fld id="{81646C50-98BD-2D4A-A4BF-D273F4B5E668}" type="datetime1">
               <a:rPr lang="en-CA" smtClean="0"/>
-              <a:t>2024-01-18</a:t>
+              <a:t>2024-01-22</a:t>
             </a:fld>
             <a:endParaRPr lang="en-US"/>
           </a:p>
@@ -2739,7 +2744,7 @@
           <a:p>
             <a:fld id="{6E31280F-14FC-9842-93A4-8C6306A1C45C}" type="datetime1">
               <a:rPr lang="en-CA" smtClean="0"/>
-              <a:t>2024-01-18</a:t>
+              <a:t>2024-01-22</a:t>
             </a:fld>
             <a:endParaRPr lang="en-US"/>
           </a:p>
@@ -3027,7 +3032,7 @@
           <a:p>
             <a:fld id="{8097DB7D-7733-1746-A31E-60986AC6BE32}" type="datetime1">
               <a:rPr lang="en-CA" smtClean="0"/>
-              <a:t>2024-01-18</a:t>
+              <a:t>2024-01-22</a:t>
             </a:fld>
             <a:endParaRPr lang="en-US"/>
           </a:p>
@@ -3268,7 +3273,7 @@
           <a:p>
             <a:fld id="{FBFE7444-AD91-5D41-930E-55508A89368D}" type="datetime1">
               <a:rPr lang="en-CA" smtClean="0"/>
-              <a:t>2024-01-18</a:t>
+              <a:t>2024-01-22</a:t>
             </a:fld>
             <a:endParaRPr lang="en-US"/>
           </a:p>
@@ -4117,10 +4122,8 @@
                 <a:effectLst/>
                 <a:latin typeface="-apple-system"/>
               </a:rPr>
-              <a:t>If I were to start my own channel: may be wise to create tutorials on similar foundational topics. This was my suspicion, but good to see.</a:t>
-            </a:r>
-          </a:p>
-          <a:p>
+              <a:t>If I were to start my own channel: may be wise to create tutorials on similar foundational topics. </a:t>
+            </a:r>
             <a:endParaRPr lang="en-US" dirty="0"/>
           </a:p>
         </p:txBody>
@@ -4277,13 +4280,13 @@
         </p:nvSpPr>
         <p:spPr>
           <a:xfrm>
-            <a:off x="7260116" y="2016087"/>
-            <a:ext cx="4850176" cy="5437276"/>
+            <a:off x="7260115" y="2016086"/>
+            <a:ext cx="3899971" cy="3899971"/>
           </a:xfrm>
         </p:spPr>
         <p:txBody>
           <a:bodyPr>
-            <a:normAutofit fontScale="47500" lnSpcReduction="20000"/>
+            <a:normAutofit fontScale="55000" lnSpcReduction="20000"/>
           </a:bodyPr>
           <a:lstStyle/>
           <a:p>
@@ -4293,87 +4296,58 @@
                 <a:effectLst/>
                 <a:latin typeface="-apple-system"/>
               </a:rPr>
-              <a:t>Video popularity = a cyclical pattern 2016-18: super popular videos to date each </a:t>
-            </a:r>
-            <a:r>
-              <a:rPr lang="en-CA" sz="4000" b="0" i="0" dirty="0" err="1">
-                <a:effectLst/>
-                <a:latin typeface="-apple-system"/>
-              </a:rPr>
-              <a:t>yr</a:t>
-            </a:r>
+              <a:t>Video popularity = a cyclical pattern 2016-18</a:t>
+            </a:r>
+          </a:p>
+          <a:p>
+            <a:pPr algn="l"/>
             <a:r>
               <a:rPr lang="en-CA" sz="4000" b="0" i="0" dirty="0">
                 <a:effectLst/>
                 <a:latin typeface="-apple-system"/>
               </a:rPr>
-              <a:t> (2-4 mil views) before levelling out again (0.5-1 mil views)</a:t>
+              <a:t>Any videos published after in 2022-23 have had consistently lower views (thousands).</a:t>
             </a:r>
           </a:p>
           <a:p>
             <a:pPr algn="l"/>
             <a:r>
-              <a:rPr lang="en-CA" sz="4000" dirty="0">
-                <a:latin typeface="-apple-system"/>
-              </a:rPr>
-              <a:t>2019 -2021, new videos have</a:t>
-            </a:r>
-            <a:r>
               <a:rPr lang="en-CA" sz="4000" b="0" i="0" dirty="0">
                 <a:effectLst/>
                 <a:latin typeface="-apple-system"/>
               </a:rPr>
-              <a:t>&lt;1 mill views to date. Video views </a:t>
-            </a:r>
-            <a:r>
-              <a:rPr lang="en-CA" sz="4000" dirty="0">
-                <a:latin typeface="-apple-system"/>
-              </a:rPr>
-              <a:t>to date </a:t>
-            </a:r>
-            <a:r>
-              <a:rPr lang="en-CA" sz="4000" b="0" i="0" dirty="0">
-                <a:effectLst/>
-                <a:latin typeface="-apple-system"/>
-              </a:rPr>
-              <a:t>peak again for those published in 2021 (1.5-2 mil), but any videos published after that (2022-2023) have had consistently lower views (thousands).</a:t>
-            </a:r>
-          </a:p>
-          <a:p>
-            <a:pPr algn="l"/>
-            <a:r>
-              <a:rPr lang="en-CA" sz="4000" b="0" i="0" dirty="0">
-                <a:effectLst/>
-                <a:latin typeface="-apple-system"/>
-              </a:rPr>
-              <a:t>Perhaps  skyrocketing views related to COVID-19 pandemic: any videos published before 2020 = greater </a:t>
-            </a:r>
-            <a:r>
-              <a:rPr lang="en-CA" sz="4000" b="0" i="0" dirty="0" err="1">
+              <a:t>Perhaps skyrocketing views related to COVID-19 pandemic: </a:t>
+            </a:r>
+          </a:p>
+          <a:p>
+            <a:pPr lvl="1"/>
+            <a:r>
+              <a:rPr lang="en-CA" sz="3600" dirty="0">
+                <a:latin typeface="-apple-system"/>
+              </a:rPr>
+              <a:t>Videos </a:t>
+            </a:r>
+            <a:r>
+              <a:rPr lang="en-CA" sz="3600" b="0" i="0" dirty="0">
+                <a:effectLst/>
+                <a:latin typeface="-apple-system"/>
+              </a:rPr>
+              <a:t>published before 2020 = greater </a:t>
+            </a:r>
+            <a:r>
+              <a:rPr lang="en-CA" sz="3600" b="0" i="0" dirty="0" err="1">
                 <a:effectLst/>
                 <a:latin typeface="-apple-system"/>
               </a:rPr>
               <a:t>opp</a:t>
             </a:r>
             <a:r>
-              <a:rPr lang="en-CA" sz="4000" b="0" i="0" dirty="0">
+              <a:rPr lang="en-CA" sz="3600" b="0" i="0" dirty="0">
                 <a:effectLst/>
                 <a:latin typeface="-apple-system"/>
               </a:rPr>
               <a:t> to skyrocket b/c greater need for them in 2020 and 2021.</a:t>
             </a:r>
-          </a:p>
-          <a:p>
-            <a:pPr algn="l"/>
-            <a:r>
-              <a:rPr lang="en-CA" sz="4000" b="0" i="0" dirty="0">
-                <a:effectLst/>
-                <a:latin typeface="-apple-system"/>
-              </a:rPr>
-              <a:t>The resurgence of new videos with views over a million happens again in 2021; I wonder if that's still COVID-19 related. Or perhaps it's the content he was putting out in 2021 - perhaps it was better than what he put out in 2020.</a:t>
-            </a:r>
-          </a:p>
-          <a:p>
             <a:endParaRPr lang="en-US" dirty="0"/>
           </a:p>
         </p:txBody>
@@ -4483,66 +4457,15 @@
         </p:nvSpPr>
         <p:spPr>
           <a:xfrm>
-            <a:off x="6979184" y="1695795"/>
-            <a:ext cx="4926379" cy="5025679"/>
+            <a:off x="6979185" y="1860656"/>
+            <a:ext cx="4544458" cy="4660554"/>
           </a:xfrm>
         </p:spPr>
         <p:txBody>
           <a:bodyPr>
-            <a:normAutofit fontScale="62500" lnSpcReduction="20000"/>
+            <a:normAutofit fontScale="77500" lnSpcReduction="20000"/>
           </a:bodyPr>
           <a:lstStyle/>
-          <a:p>
-            <a:pPr algn="l"/>
-            <a:r>
-              <a:rPr lang="en-CA" b="0" i="0" dirty="0">
-                <a:effectLst/>
-                <a:latin typeface="-apple-system"/>
-              </a:rPr>
-              <a:t>Most active years: 2016-2018 (90-160 videos/year)</a:t>
-            </a:r>
-          </a:p>
-          <a:p>
-            <a:pPr algn="l"/>
-            <a:r>
-              <a:rPr lang="en-CA" b="0" i="0" dirty="0">
-                <a:effectLst/>
-                <a:latin typeface="-apple-system"/>
-              </a:rPr>
-              <a:t>Least active year: 2019 (&lt;20)</a:t>
-            </a:r>
-          </a:p>
-          <a:p>
-            <a:pPr algn="l"/>
-            <a:r>
-              <a:rPr lang="en-CA" dirty="0">
-                <a:latin typeface="-apple-system"/>
-              </a:rPr>
-              <a:t>More new videos again in 2020 and 2021 (40-80/</a:t>
-            </a:r>
-            <a:r>
-              <a:rPr lang="en-CA" dirty="0" err="1">
-                <a:latin typeface="-apple-system"/>
-              </a:rPr>
-              <a:t>yr</a:t>
-            </a:r>
-            <a:r>
-              <a:rPr lang="en-CA" dirty="0">
-                <a:latin typeface="-apple-system"/>
-              </a:rPr>
-              <a:t>).</a:t>
-            </a:r>
-          </a:p>
-          <a:p>
-            <a:pPr algn="l"/>
-            <a:r>
-              <a:rPr lang="en-CA" b="0" i="0" dirty="0">
-                <a:effectLst/>
-                <a:latin typeface="-apple-system"/>
-              </a:rPr>
-              <a:t>2022: &lt;20 and 2023: ~80</a:t>
-            </a:r>
-          </a:p>
           <a:p>
             <a:pPr marL="0" indent="0" algn="l">
               <a:buNone/>
@@ -4552,44 +4475,38 @@
                 <a:effectLst/>
                 <a:latin typeface="-apple-system"/>
               </a:rPr>
-              <a:t>Maybe TOCT posted more videos again in 2020, because views for videos posted 2016-2018 </a:t>
-            </a:r>
-            <a:r>
-              <a:rPr lang="en-CA" b="1" i="0" dirty="0">
-                <a:effectLst/>
-                <a:latin typeface="-apple-system"/>
-              </a:rPr>
-              <a:t>took off during the pandemic (2020-21)</a:t>
+              <a:t>Least active year</a:t>
+            </a:r>
+            <a:r>
+              <a:rPr lang="en-CA" dirty="0">
+                <a:latin typeface="-apple-system"/>
+              </a:rPr>
+              <a:t> was </a:t>
             </a:r>
             <a:r>
               <a:rPr lang="en-CA" b="0" i="0" dirty="0">
                 <a:effectLst/>
                 <a:latin typeface="-apple-system"/>
               </a:rPr>
-              <a:t>. </a:t>
-            </a:r>
-          </a:p>
-          <a:p>
-            <a:pPr algn="l"/>
-            <a:r>
-              <a:rPr lang="en-CA" b="0" i="0" dirty="0">
-                <a:effectLst/>
-                <a:latin typeface="-apple-system"/>
-              </a:rPr>
-              <a:t>Perhaps TOCT was less interested in continuing channel after 2018 (hence </a:t>
+              <a:t>2019 (&lt;20), with m</a:t>
             </a:r>
             <a:r>
               <a:rPr lang="en-CA" dirty="0">
                 <a:latin typeface="-apple-system"/>
               </a:rPr>
-              <a:t>few new videos in 2019), </a:t>
-            </a:r>
-            <a:r>
-              <a:rPr lang="en-CA" b="0" i="0" dirty="0">
-                <a:effectLst/>
-                <a:latin typeface="-apple-system"/>
-              </a:rPr>
-              <a:t>but the incentive of skyrocketing views (and therefore payouts for his content creation services) encouraged more videos in 2020 and 2021.</a:t>
+              <a:t>ore new videos again in 2020 and 2021 (40-80/</a:t>
+            </a:r>
+            <a:r>
+              <a:rPr lang="en-CA" dirty="0" err="1">
+                <a:latin typeface="-apple-system"/>
+              </a:rPr>
+              <a:t>yr</a:t>
+            </a:r>
+            <a:r>
+              <a:rPr lang="en-CA" dirty="0">
+                <a:latin typeface="-apple-system"/>
+              </a:rPr>
+              <a:t>).</a:t>
             </a:r>
           </a:p>
           <a:p>
@@ -4601,10 +4518,52 @@
                 <a:effectLst/>
                 <a:latin typeface="-apple-system"/>
               </a:rPr>
-              <a:t>It would be interesting to see view counts for his 2016-2018 videos in 2019 (pre-covid). If views weren’t nearly as high as they are now to date, it would make sense why he felt less called to create content in 2019, then called again in 2020.</a:t>
-            </a:r>
-          </a:p>
-          <a:p>
+              <a:t>Maybe TOCT posted more videos in 2020, b/c 2016-2018 videos </a:t>
+            </a:r>
+            <a:r>
+              <a:rPr lang="en-CA" b="1" i="0" dirty="0">
+                <a:effectLst/>
+                <a:latin typeface="-apple-system"/>
+              </a:rPr>
+              <a:t>took off during the pandemic (2020-21)</a:t>
+            </a:r>
+            <a:r>
+              <a:rPr lang="en-CA" b="0" i="0" dirty="0">
+                <a:effectLst/>
+                <a:latin typeface="-apple-system"/>
+              </a:rPr>
+              <a:t>. </a:t>
+            </a:r>
+          </a:p>
+          <a:p>
+            <a:pPr algn="l"/>
+            <a:r>
+              <a:rPr lang="en-CA" b="0" i="0" dirty="0">
+                <a:effectLst/>
+                <a:latin typeface="-apple-system"/>
+              </a:rPr>
+              <a:t>Perhaps skyrocketing views encouraged TOCT to post more videos in 2020 and 2021, after posting very few in 2019.</a:t>
+            </a:r>
+          </a:p>
+          <a:p>
+            <a:pPr marL="0" indent="0" algn="l">
+              <a:buNone/>
+            </a:pPr>
+            <a:r>
+              <a:rPr lang="en-CA" b="0" i="0" dirty="0">
+                <a:effectLst/>
+                <a:latin typeface="-apple-system"/>
+              </a:rPr>
+              <a:t>It would be interesting to see view counts for his 2016-2018 videos in 2019 (pre-covid)</a:t>
+            </a:r>
+          </a:p>
+          <a:p>
+            <a:r>
+              <a:rPr lang="en-CA" dirty="0">
+                <a:latin typeface="-apple-system"/>
+              </a:rPr>
+              <a:t>Did TOCT’s popularity truly skyrocket with the onset of COVID-19 pandemic?</a:t>
+            </a:r>
             <a:endParaRPr lang="en-US" dirty="0"/>
           </a:p>
         </p:txBody>
@@ -4793,20 +4752,7 @@
                 <a:effectLst/>
                 <a:latin typeface="-apple-system"/>
               </a:rPr>
-              <a:t>Num of subscribers and num of views seem highly correlated (r=0.9997). </a:t>
-            </a:r>
-            <a:r>
-              <a:rPr lang="en-CA" dirty="0">
-                <a:latin typeface="-apple-system"/>
-              </a:rPr>
-              <a:t>C</a:t>
-            </a:r>
-            <a:r>
-              <a:rPr lang="en-CA" b="0" i="0" dirty="0">
-                <a:effectLst/>
-                <a:latin typeface="-apple-system"/>
-              </a:rPr>
-              <a:t>ould perform statistical testing to verify the statistical significance, but I'd say it's not necessary.</a:t>
+              <a:t>Num of subscribers and num of views seem highly correlated (r=0.9997).  Statistical testing likely not necessary.</a:t>
             </a:r>
           </a:p>
           <a:p>
@@ -4833,7 +4779,13 @@
                 <a:effectLst/>
                 <a:latin typeface="-apple-system"/>
               </a:rPr>
-              <a:t> of videos = bigger influence on views than quantity. Could perform statistical testing, but this seems like a conclusion that checks out.</a:t>
+              <a:t> of videos = bigger influence on views than quantity. Could perform statistical testing, but </a:t>
+            </a:r>
+            <a:r>
+              <a:rPr lang="en-CA" dirty="0">
+                <a:latin typeface="-apple-system"/>
+              </a:rPr>
+              <a:t>conclusion seems reasonable.</a:t>
             </a:r>
           </a:p>
           <a:p>
@@ -4846,7 +4798,7 @@
                 <a:effectLst/>
                 <a:latin typeface="-apple-system"/>
               </a:rPr>
-              <a:t>The Organic Chemistry Tutor's most popular videos are on foundational chemistry topics, which makes sense why they are so attractive.</a:t>
+              <a:t>The Organic Chemistry Tutor's most popular videos are on foundational chemistry topics.</a:t>
             </a:r>
           </a:p>
           <a:p>
@@ -4859,7 +4811,7 @@
                 <a:effectLst/>
                 <a:latin typeface="-apple-system"/>
               </a:rPr>
-              <a:t>The Organic Chemistry Tutor's most popular videos were published between 2016-2018. Perhaps onset of COVID-19 pandemic (2020) allowed for rise in views for these videos. Would be cool if we could access view count data from 2019.</a:t>
+              <a:t>The Organic Chemistry Tutor's most popular videos were published between 2016-2018. Perhaps onset of COVID-19 pandemic (2020) allowed for rise in views for these videos. Would be cool if we could access view count data from 2019 – did he really take off after COVID-19 pandemic?</a:t>
             </a:r>
           </a:p>
           <a:p>
@@ -4885,7 +4837,7 @@
                 <a:effectLst/>
                 <a:latin typeface="-apple-system"/>
               </a:rPr>
-              <a:t>views may have encouraged him to post more content in 2020, after posting less in 2019. Perhaps incentive was there to keep his channel going, once TOCT realized how much money could continue to be made from the channel in the COVID era.</a:t>
+              <a:t>views may have encouraged him to post more content in 2020, after posting less in 2019. Perhaps he felt more incentive to keep his channel going after he gained mass popularity.</a:t>
             </a:r>
           </a:p>
           <a:p>
@@ -5139,35 +5091,44 @@
         </p:nvSpPr>
         <p:spPr>
           <a:xfrm>
-            <a:off x="7003055" y="1690687"/>
+            <a:off x="7036106" y="1944075"/>
             <a:ext cx="5008836" cy="5042622"/>
           </a:xfrm>
         </p:spPr>
         <p:txBody>
           <a:bodyPr>
-            <a:normAutofit lnSpcReduction="10000"/>
+            <a:normAutofit/>
           </a:bodyPr>
           <a:lstStyle/>
           <a:p>
             <a:pPr algn="l"/>
             <a:r>
+              <a:rPr lang="en-CA" b="0" i="0" u="sng" dirty="0">
+                <a:effectLst/>
+                <a:latin typeface="-apple-system"/>
+              </a:rPr>
+              <a:t>The Organic Chemistry Tutor </a:t>
+            </a:r>
+            <a:r>
               <a:rPr lang="en-CA" b="0" i="0" dirty="0">
                 <a:effectLst/>
                 <a:latin typeface="-apple-system"/>
               </a:rPr>
-              <a:t>The graph displays the top 7 Chemistry-related Channels on YouTube </a:t>
-            </a:r>
-            <a:r>
-              <a:rPr lang="en-CA" b="1" i="0" dirty="0">
-                <a:effectLst/>
-                <a:latin typeface="-apple-system"/>
-              </a:rPr>
-              <a:t>by subscribers</a:t>
-            </a:r>
-            <a:endParaRPr lang="en-CA" b="0" i="0" dirty="0">
-              <a:effectLst/>
-              <a:latin typeface="-apple-system"/>
-            </a:endParaRPr>
+              <a:t>has the most subscribers by a long shot</a:t>
+            </a:r>
+            <a:r>
+              <a:rPr lang="en-CA" dirty="0">
+                <a:latin typeface="-apple-system"/>
+              </a:rPr>
+              <a:t> (</a:t>
+            </a:r>
+            <a:r>
+              <a:rPr lang="en-CA" b="0" i="0" dirty="0">
+                <a:effectLst/>
+                <a:latin typeface="-apple-system"/>
+              </a:rPr>
+              <a:t>~ 7.27 million).</a:t>
+            </a:r>
           </a:p>
           <a:p>
             <a:pPr algn="l"/>
@@ -5176,52 +5137,15 @@
                 <a:effectLst/>
                 <a:latin typeface="-apple-system"/>
               </a:rPr>
-              <a:t>The Organic Chemistry Tutor </a:t>
+              <a:t>Chemistry Tutorial</a:t>
             </a:r>
             <a:r>
               <a:rPr lang="en-CA" b="0" i="0" dirty="0">
                 <a:effectLst/>
                 <a:latin typeface="-apple-system"/>
               </a:rPr>
-              <a:t>has the most subscribers by a long shot, at ~ 7.27 million.</a:t>
-            </a:r>
-          </a:p>
-          <a:p>
-            <a:pPr algn="l"/>
-            <a:r>
-              <a:rPr lang="en-CA" b="0" i="0" dirty="0">
-                <a:effectLst/>
-                <a:latin typeface="-apple-system"/>
-              </a:rPr>
-              <a:t>At the bottom of this top 7 is the </a:t>
-            </a:r>
-            <a:r>
-              <a:rPr lang="en-CA" b="0" i="0" u="sng" dirty="0">
-                <a:effectLst/>
-                <a:latin typeface="-apple-system"/>
-              </a:rPr>
-              <a:t>Chemistry Tutorial </a:t>
-            </a:r>
-            <a:r>
-              <a:rPr lang="en-CA" b="0" i="0" dirty="0">
-                <a:effectLst/>
-                <a:latin typeface="-apple-system"/>
-              </a:rPr>
-              <a:t>(~33k subscribers).</a:t>
-            </a:r>
-          </a:p>
-          <a:p>
-            <a:pPr algn="l"/>
-            <a:r>
-              <a:rPr lang="en-CA" dirty="0">
-                <a:latin typeface="-apple-system"/>
-              </a:rPr>
-              <a:t>The Organic Chemistry Tutor must be doing something right. Let’s keep looking…</a:t>
-            </a:r>
-            <a:endParaRPr lang="en-CA" b="0" i="0" dirty="0">
-              <a:effectLst/>
-              <a:latin typeface="-apple-system"/>
-            </a:endParaRPr>
+              <a:t> is at the bottom of the top 7 (~33k subscribers).</a:t>
+            </a:r>
           </a:p>
         </p:txBody>
       </p:sp>
@@ -5344,19 +5268,31 @@
         </p:spPr>
         <p:txBody>
           <a:bodyPr>
-            <a:normAutofit fontScale="70000" lnSpcReduction="20000"/>
+            <a:normAutofit/>
           </a:bodyPr>
           <a:lstStyle/>
           <a:p>
-            <a:pPr marL="0" indent="0" algn="l">
-              <a:buNone/>
-            </a:pPr>
             <a:r>
               <a:rPr lang="en-CA" b="0" i="0" dirty="0">
                 <a:effectLst/>
                 <a:latin typeface="-apple-system"/>
               </a:rPr>
-              <a:t>The same 7 YouTube Channels have the most subscribers and the most views, although their orders vary slightly.</a:t>
+              <a:t>The same 7 YouTube Channels have the most subscribers AND most views.</a:t>
+            </a:r>
+          </a:p>
+          <a:p>
+            <a:r>
+              <a:rPr lang="en-CA" dirty="0">
+                <a:latin typeface="-apple-system"/>
+              </a:rPr>
+              <a:t>S</a:t>
+            </a:r>
+            <a:r>
+              <a:rPr lang="en-CA" b="0" i="0" dirty="0">
+                <a:effectLst/>
+                <a:latin typeface="-apple-system"/>
+              </a:rPr>
+              <a:t>ubscribers and views seem correlated - the more subscribers a channel has, the more views. </a:t>
             </a:r>
           </a:p>
           <a:p>
@@ -5369,33 +5305,41 @@
                 <a:effectLst/>
                 <a:latin typeface="-apple-system"/>
               </a:rPr>
-              <a:t>The Organic Chemistry Tutor = most views AND subscribers, by far.</a:t>
-            </a:r>
-          </a:p>
-          <a:p>
-            <a:pPr algn="l">
-              <a:buFont typeface="Arial" panose="020B0604020202020204" pitchFamily="34" charset="0"/>
-              <a:buChar char="•"/>
-            </a:pPr>
+              <a:t>Exception: The Glaser Tutoring Company</a:t>
+            </a:r>
+          </a:p>
+          <a:p>
+            <a:pPr lvl="1"/>
             <a:r>
               <a:rPr lang="en-CA" b="0" i="0" dirty="0">
                 <a:effectLst/>
                 <a:latin typeface="-apple-system"/>
               </a:rPr>
-              <a:t>Melissa Maribel = 2nd from the top for both views and subscribers.</a:t>
-            </a:r>
-          </a:p>
-          <a:p>
-            <a:pPr algn="l">
-              <a:buFont typeface="Arial" panose="020B0604020202020204" pitchFamily="34" charset="0"/>
-              <a:buChar char="•"/>
-            </a:pPr>
+              <a:t>Subscribers &lt; Tahsin and </a:t>
+            </a:r>
+            <a:r>
+              <a:rPr lang="en-CA" b="0" i="0" dirty="0" err="1">
+                <a:effectLst/>
+                <a:latin typeface="-apple-system"/>
+              </a:rPr>
+              <a:t>Tomar</a:t>
+            </a:r>
             <a:r>
               <a:rPr lang="en-CA" b="0" i="0" dirty="0">
                 <a:effectLst/>
                 <a:latin typeface="-apple-system"/>
               </a:rPr>
-              <a:t>The Glaser Tutoring Company has fewer subscribers than Tahsin Tutorial and </a:t>
+              <a:t> </a:t>
+            </a:r>
+          </a:p>
+          <a:p>
+            <a:pPr lvl="1"/>
+            <a:r>
+              <a:rPr lang="en-CA" b="0" i="0" dirty="0">
+                <a:effectLst/>
+                <a:latin typeface="-apple-system"/>
+              </a:rPr>
+              <a:t>Views &gt; Tahsin and </a:t>
             </a:r>
             <a:r>
               <a:rPr lang="en-CA" b="0" i="0" dirty="0" err="1">
@@ -5404,57 +5348,10 @@
               </a:rPr>
               <a:t>Tomar</a:t>
             </a:r>
-            <a:r>
-              <a:rPr lang="en-CA" b="0" i="0" dirty="0">
-                <a:effectLst/>
-                <a:latin typeface="-apple-system"/>
-              </a:rPr>
-              <a:t> Chemistry Tutorial, BUT Glaser has MORE VIEWS than them both.</a:t>
-            </a:r>
-          </a:p>
-          <a:p>
-            <a:pPr algn="l">
-              <a:buFont typeface="Arial" panose="020B0604020202020204" pitchFamily="34" charset="0"/>
-              <a:buChar char="•"/>
-            </a:pPr>
-            <a:r>
-              <a:rPr lang="en-CA" b="0" i="0" dirty="0">
-                <a:effectLst/>
-                <a:latin typeface="-apple-system"/>
-              </a:rPr>
-              <a:t>Chemistry Tutorial channel = bottom of top 7, for both views and subscribers.</a:t>
-            </a:r>
-          </a:p>
-          <a:p>
-            <a:pPr marL="0" indent="0">
-              <a:buNone/>
-            </a:pPr>
-            <a:r>
-              <a:rPr lang="en-CA" dirty="0">
-                <a:latin typeface="-apple-system"/>
-              </a:rPr>
-              <a:t>S</a:t>
-            </a:r>
-            <a:r>
-              <a:rPr lang="en-CA" b="0" i="0" dirty="0">
-                <a:effectLst/>
-                <a:latin typeface="-apple-system"/>
-              </a:rPr>
-              <a:t>ubscribers and views seem to be correlated - the more subscribers a channel has, the more views. </a:t>
-            </a:r>
-          </a:p>
-          <a:p>
-            <a:pPr marL="0" indent="0">
-              <a:buNone/>
-            </a:pPr>
-            <a:r>
-              <a:rPr lang="en-CA" b="0" i="0" dirty="0">
-                <a:effectLst/>
-                <a:latin typeface="-apple-system"/>
-              </a:rPr>
-              <a:t>The exception to this subscribers/views trend is Glaser Tutoring Company.</a:t>
-            </a:r>
-            <a:endParaRPr lang="en-US" dirty="0"/>
+            <a:endParaRPr lang="en-CA" b="0" i="0" dirty="0">
+              <a:effectLst/>
+              <a:latin typeface="-apple-system"/>
+            </a:endParaRPr>
           </a:p>
         </p:txBody>
       </p:sp>
@@ -5530,7 +5427,7 @@
               <a:rPr lang="en-US" smtClean="0"/>
               <a:t>4</a:t>
             </a:fld>
-            <a:endParaRPr lang="en-US"/>
+            <a:endParaRPr lang="en-US" dirty="0"/>
           </a:p>
         </p:txBody>
       </p:sp>
@@ -5632,15 +5529,20 @@
                 <a:effectLst/>
                 <a:latin typeface="-apple-system"/>
               </a:rPr>
-              <a:t>Subscribers and Views seem to be highly correlated, with correlation coefficient r = 0.9997</a:t>
-            </a:r>
-          </a:p>
-          <a:p>
+              <a:t>Subscribers and Views seem highly correlated</a:t>
+            </a:r>
             <a:r>
               <a:rPr lang="en-CA" dirty="0">
                 <a:latin typeface="-apple-system"/>
               </a:rPr>
-              <a:t>This makes sense</a:t>
+              <a:t> (</a:t>
+            </a:r>
+            <a:r>
+              <a:rPr lang="en-CA" b="0" i="0" dirty="0">
+                <a:effectLst/>
+                <a:latin typeface="-apple-system"/>
+              </a:rPr>
+              <a:t>r = 0.9997)</a:t>
             </a:r>
           </a:p>
           <a:p>
@@ -5832,13 +5734,13 @@
         </p:nvSpPr>
         <p:spPr>
           <a:xfrm>
-            <a:off x="7171981" y="1512744"/>
+            <a:off x="7171981" y="1528867"/>
             <a:ext cx="4803355" cy="5221988"/>
           </a:xfrm>
         </p:spPr>
         <p:txBody>
           <a:bodyPr>
-            <a:normAutofit fontScale="70000" lnSpcReduction="20000"/>
+            <a:normAutofit fontScale="92500" lnSpcReduction="20000"/>
           </a:bodyPr>
           <a:lstStyle/>
           <a:p>
@@ -5850,7 +5752,7 @@
                 <a:effectLst/>
                 <a:latin typeface="-apple-system"/>
               </a:rPr>
-              <a:t>It seems that video count is NOT correlated with view and subscriber count.</a:t>
+              <a:t>It seems video count is NOT correlated with view and subscriber count.</a:t>
             </a:r>
           </a:p>
           <a:p>
@@ -5863,7 +5765,27 @@
                 <a:effectLst/>
                 <a:latin typeface="-apple-system"/>
               </a:rPr>
-              <a:t>The Organic Chemistry Tutor = 1/2 as many videos as The Glaser Tutoring Company, yet 85x more VIEWS and 130x more SUBSCRIBERS.</a:t>
+              <a:t>The Organic Chemistry Tutor:</a:t>
+            </a:r>
+          </a:p>
+          <a:p>
+            <a:pPr lvl="1"/>
+            <a:r>
+              <a:rPr lang="en-CA" b="0" i="0" dirty="0">
+                <a:effectLst/>
+                <a:latin typeface="-apple-system"/>
+              </a:rPr>
+              <a:t># videos = ½ videos by Glaser</a:t>
+            </a:r>
+          </a:p>
+          <a:p>
+            <a:pPr lvl="1"/>
+            <a:r>
+              <a:rPr lang="en-CA" b="0" i="0" dirty="0">
+                <a:effectLst/>
+                <a:latin typeface="-apple-system"/>
+              </a:rPr>
+              <a:t>Yet # views = 85x Glaser’s views and subscribers = 130x Glaser’s subscribers.</a:t>
             </a:r>
           </a:p>
           <a:p>
@@ -5876,7 +5798,7 @@
                 <a:effectLst/>
                 <a:latin typeface="-apple-system"/>
               </a:rPr>
-              <a:t>Melissa Maribel =/= top 6 channels with most VIDEOS (268), BUT more VIEWS and more SUBSCRIBERS than all channels with 500 - 1000 videos. Good for her.</a:t>
+              <a:t>Melissa Maribel =/= top 6 channels with most videos.</a:t>
             </a:r>
           </a:p>
           <a:p>
@@ -5903,7 +5825,33 @@
                 <a:effectLst/>
                 <a:latin typeface="-apple-system"/>
               </a:rPr>
-              <a:t>) &gt; 1000 videos (3rd most) but =/= top 7 for most VIEWS or most SUBSCRIBERS.</a:t>
+              <a:t>) </a:t>
+            </a:r>
+          </a:p>
+          <a:p>
+            <a:pPr lvl="1"/>
+            <a:r>
+              <a:rPr lang="en-CA" dirty="0">
+                <a:latin typeface="-apple-system"/>
+              </a:rPr>
+              <a:t>Top 7 for most videos</a:t>
+            </a:r>
+          </a:p>
+          <a:p>
+            <a:pPr lvl="1"/>
+            <a:r>
+              <a:rPr lang="en-CA" b="0" i="0" dirty="0">
+                <a:effectLst/>
+                <a:latin typeface="-apple-system"/>
+              </a:rPr>
+              <a:t>Not Top 7 for views or </a:t>
+            </a:r>
+            <a:r>
+              <a:rPr lang="en-US" b="0" i="0" dirty="0">
+                <a:effectLst/>
+                <a:latin typeface="-apple-system"/>
+              </a:rPr>
+              <a:t>subscribers</a:t>
             </a:r>
             <a:endParaRPr lang="en-US" dirty="0"/>
           </a:p>
@@ -5913,16 +5861,7 @@
             </a:pPr>
             <a:r>
               <a:rPr lang="en-US" dirty="0"/>
-              <a:t>Thus, num of videos &lt;-&gt; popularity</a:t>
-            </a:r>
-          </a:p>
-          <a:p>
-            <a:pPr marL="0" indent="0">
-              <a:buNone/>
-            </a:pPr>
-            <a:r>
-              <a:rPr lang="en-US" dirty="0"/>
-              <a:t>If quantity of videos doesn’t appear correlated with subscriber or view counts, then it must be another factor making The Organic Chemistry Tutor and Melissa Maribel so successful – likely QUALITY.</a:t>
+              <a:t>Perhaps Quality of Videos = more important</a:t>
             </a:r>
           </a:p>
         </p:txBody>
@@ -5999,7 +5938,7 @@
               <a:rPr lang="en-US" smtClean="0"/>
               <a:t>6</a:t>
             </a:fld>
-            <a:endParaRPr lang="en-US"/>
+            <a:endParaRPr lang="en-US" dirty="0"/>
           </a:p>
         </p:txBody>
       </p:sp>
@@ -6084,17 +6023,26 @@
         </p:nvSpPr>
         <p:spPr>
           <a:xfrm>
-            <a:off x="8474941" y="1891276"/>
-            <a:ext cx="3473769" cy="4798369"/>
+            <a:off x="8474942" y="1891277"/>
+            <a:ext cx="3202938" cy="4597781"/>
           </a:xfrm>
         </p:spPr>
         <p:txBody>
           <a:bodyPr>
-            <a:normAutofit fontScale="85000" lnSpcReduction="10000"/>
+            <a:normAutofit fontScale="92500" lnSpcReduction="10000"/>
           </a:bodyPr>
           <a:lstStyle/>
           <a:p>
             <a:pPr algn="l"/>
+            <a:r>
+              <a:rPr lang="en-CA" dirty="0">
+                <a:solidFill>
+                  <a:srgbClr val="000000"/>
+                </a:solidFill>
+                <a:latin typeface="var(--jp-content-font-family)"/>
+              </a:rPr>
+              <a:t>N</a:t>
+            </a:r>
             <a:r>
               <a:rPr lang="en-CA" b="0" i="0" dirty="0">
                 <a:solidFill>
@@ -6103,7 +6051,7 @@
                 <a:effectLst/>
                 <a:latin typeface="var(--jp-content-font-family)"/>
               </a:rPr>
-              <a:t>Seems num of videos and views are weakly correlated (R= 0.2955).</a:t>
+              <a:t>um of videos and views seem weakly correlated (R= 0.2955).</a:t>
             </a:r>
           </a:p>
           <a:p>
@@ -6116,7 +6064,7 @@
                 <a:effectLst/>
                 <a:latin typeface="var(--jp-content-font-family)"/>
               </a:rPr>
-              <a:t>Need statistical testing to confirm whether weak correlation is significant or by chance.</a:t>
+              <a:t>Need statistical testing to confirm significance.</a:t>
             </a:r>
           </a:p>
           <a:p>
@@ -6129,20 +6077,7 @@
                 <a:effectLst/>
                 <a:latin typeface="var(--jp-content-font-family)"/>
               </a:rPr>
-              <a:t>Another good metric to assess would be date that the channel started.</a:t>
-            </a:r>
-          </a:p>
-          <a:p>
-            <a:pPr algn="l"/>
-            <a:r>
-              <a:rPr lang="en-CA" b="0" i="0" dirty="0">
-                <a:solidFill>
-                  <a:srgbClr val="000000"/>
-                </a:solidFill>
-                <a:effectLst/>
-                <a:latin typeface="var(--jp-content-font-family)"/>
-              </a:rPr>
-              <a:t>Do those channels that have been around longer = have more views and subscribers?</a:t>
+              <a:t>Do those channels that have been around longer = have more views and subscribers? (Future analysis)</a:t>
             </a:r>
           </a:p>
           <a:p>
@@ -6427,7 +6362,7 @@
                 <a:effectLst/>
                 <a:latin typeface="-apple-system"/>
               </a:rPr>
-              <a:t>TOCT’s top video has ~1 million more views that the its second most popular video. </a:t>
+              <a:t>TOCT’s top video has ~1 million more views than that of its second most popular video. </a:t>
             </a:r>
           </a:p>
           <a:p>

</xml_diff>